<commit_message>
Notify the user if a new updated app is available
</commit_message>
<xml_diff>
--- a/app_logos.pptx
+++ b/app_logos.pptx
@@ -8,8 +8,9 @@
     <p:sldId id="256" r:id="rId2"/>
     <p:sldId id="258" r:id="rId3"/>
     <p:sldId id="259" r:id="rId4"/>
-    <p:sldId id="260" r:id="rId5"/>
-    <p:sldId id="261" r:id="rId6"/>
+    <p:sldId id="262" r:id="rId5"/>
+    <p:sldId id="260" r:id="rId6"/>
+    <p:sldId id="261" r:id="rId7"/>
   </p:sldIdLst>
   <p:sldSz cx="12192000" cy="6858000"/>
   <p:notesSz cx="6858000" cy="9144000"/>
@@ -263,7 +264,7 @@
           <a:p>
             <a:fld id="{01060C3E-6DCD-44D1-86FE-A17BB40FDE6F}" type="datetimeFigureOut">
               <a:rPr lang="en-US" smtClean="0"/>
-              <a:t>2019-06-20</a:t>
+              <a:t>2019-06-28</a:t>
             </a:fld>
             <a:endParaRPr lang="en-US"/>
           </a:p>
@@ -461,7 +462,7 @@
           <a:p>
             <a:fld id="{01060C3E-6DCD-44D1-86FE-A17BB40FDE6F}" type="datetimeFigureOut">
               <a:rPr lang="en-US" smtClean="0"/>
-              <a:t>2019-06-20</a:t>
+              <a:t>2019-06-28</a:t>
             </a:fld>
             <a:endParaRPr lang="en-US"/>
           </a:p>
@@ -669,7 +670,7 @@
           <a:p>
             <a:fld id="{01060C3E-6DCD-44D1-86FE-A17BB40FDE6F}" type="datetimeFigureOut">
               <a:rPr lang="en-US" smtClean="0"/>
-              <a:t>2019-06-20</a:t>
+              <a:t>2019-06-28</a:t>
             </a:fld>
             <a:endParaRPr lang="en-US"/>
           </a:p>
@@ -867,7 +868,7 @@
           <a:p>
             <a:fld id="{01060C3E-6DCD-44D1-86FE-A17BB40FDE6F}" type="datetimeFigureOut">
               <a:rPr lang="en-US" smtClean="0"/>
-              <a:t>2019-06-20</a:t>
+              <a:t>2019-06-28</a:t>
             </a:fld>
             <a:endParaRPr lang="en-US"/>
           </a:p>
@@ -1142,7 +1143,7 @@
           <a:p>
             <a:fld id="{01060C3E-6DCD-44D1-86FE-A17BB40FDE6F}" type="datetimeFigureOut">
               <a:rPr lang="en-US" smtClean="0"/>
-              <a:t>2019-06-20</a:t>
+              <a:t>2019-06-28</a:t>
             </a:fld>
             <a:endParaRPr lang="en-US"/>
           </a:p>
@@ -1407,7 +1408,7 @@
           <a:p>
             <a:fld id="{01060C3E-6DCD-44D1-86FE-A17BB40FDE6F}" type="datetimeFigureOut">
               <a:rPr lang="en-US" smtClean="0"/>
-              <a:t>2019-06-20</a:t>
+              <a:t>2019-06-28</a:t>
             </a:fld>
             <a:endParaRPr lang="en-US"/>
           </a:p>
@@ -1819,7 +1820,7 @@
           <a:p>
             <a:fld id="{01060C3E-6DCD-44D1-86FE-A17BB40FDE6F}" type="datetimeFigureOut">
               <a:rPr lang="en-US" smtClean="0"/>
-              <a:t>2019-06-20</a:t>
+              <a:t>2019-06-28</a:t>
             </a:fld>
             <a:endParaRPr lang="en-US"/>
           </a:p>
@@ -1960,7 +1961,7 @@
           <a:p>
             <a:fld id="{01060C3E-6DCD-44D1-86FE-A17BB40FDE6F}" type="datetimeFigureOut">
               <a:rPr lang="en-US" smtClean="0"/>
-              <a:t>2019-06-20</a:t>
+              <a:t>2019-06-28</a:t>
             </a:fld>
             <a:endParaRPr lang="en-US"/>
           </a:p>
@@ -2073,7 +2074,7 @@
           <a:p>
             <a:fld id="{01060C3E-6DCD-44D1-86FE-A17BB40FDE6F}" type="datetimeFigureOut">
               <a:rPr lang="en-US" smtClean="0"/>
-              <a:t>2019-06-20</a:t>
+              <a:t>2019-06-28</a:t>
             </a:fld>
             <a:endParaRPr lang="en-US"/>
           </a:p>
@@ -2384,7 +2385,7 @@
           <a:p>
             <a:fld id="{01060C3E-6DCD-44D1-86FE-A17BB40FDE6F}" type="datetimeFigureOut">
               <a:rPr lang="en-US" smtClean="0"/>
-              <a:t>2019-06-20</a:t>
+              <a:t>2019-06-28</a:t>
             </a:fld>
             <a:endParaRPr lang="en-US"/>
           </a:p>
@@ -2672,7 +2673,7 @@
           <a:p>
             <a:fld id="{01060C3E-6DCD-44D1-86FE-A17BB40FDE6F}" type="datetimeFigureOut">
               <a:rPr lang="en-US" smtClean="0"/>
-              <a:t>2019-06-20</a:t>
+              <a:t>2019-06-28</a:t>
             </a:fld>
             <a:endParaRPr lang="en-US"/>
           </a:p>
@@ -2913,7 +2914,7 @@
           <a:p>
             <a:fld id="{01060C3E-6DCD-44D1-86FE-A17BB40FDE6F}" type="datetimeFigureOut">
               <a:rPr lang="en-US" smtClean="0"/>
-              <a:t>2019-06-20</a:t>
+              <a:t>2019-06-28</a:t>
             </a:fld>
             <a:endParaRPr lang="en-US"/>
           </a:p>
@@ -4102,7 +4103,7 @@
             <p:spPr>
               <a:xfrm>
                 <a:off x="2856001" y="1148551"/>
-                <a:ext cx="4320000" cy="4320000"/>
+                <a:ext cx="4319999" cy="4320000"/>
               </a:xfrm>
               <a:prstGeom prst="roundRect">
                 <a:avLst/>
@@ -4819,6 +4820,360 @@
           <a:chExt cx="0" cy="0"/>
         </a:xfrm>
       </p:grpSpPr>
+      <p:grpSp>
+        <p:nvGrpSpPr>
+          <p:cNvPr id="19" name="Group 18">
+            <a:extLst>
+              <a:ext uri="{FF2B5EF4-FFF2-40B4-BE49-F238E27FC236}">
+                <a16:creationId xmlns:a16="http://schemas.microsoft.com/office/drawing/2014/main" id="{11C2B3C9-A05D-4926-9EA2-6600A63E6008}"/>
+              </a:ext>
+            </a:extLst>
+          </p:cNvPr>
+          <p:cNvGrpSpPr/>
+          <p:nvPr/>
+        </p:nvGrpSpPr>
+        <p:grpSpPr>
+          <a:xfrm>
+            <a:off x="0" y="0"/>
+            <a:ext cx="4860000" cy="4860000"/>
+            <a:chOff x="3666000" y="999000"/>
+            <a:chExt cx="4860000" cy="4860000"/>
+          </a:xfrm>
+        </p:grpSpPr>
+        <p:sp>
+          <p:nvSpPr>
+            <p:cNvPr id="18" name="Rectangle 17">
+              <a:extLst>
+                <a:ext uri="{FF2B5EF4-FFF2-40B4-BE49-F238E27FC236}">
+                  <a16:creationId xmlns:a16="http://schemas.microsoft.com/office/drawing/2014/main" id="{CEE28FBB-B67E-4336-B70F-19C31476D00F}"/>
+                </a:ext>
+              </a:extLst>
+            </p:cNvPr>
+            <p:cNvSpPr/>
+            <p:nvPr/>
+          </p:nvSpPr>
+          <p:spPr>
+            <a:xfrm>
+              <a:off x="3666000" y="999000"/>
+              <a:ext cx="4860000" cy="4860000"/>
+            </a:xfrm>
+            <a:prstGeom prst="rect">
+              <a:avLst/>
+            </a:prstGeom>
+            <a:solidFill>
+              <a:schemeClr val="accent4"/>
+            </a:solidFill>
+            <a:ln>
+              <a:noFill/>
+            </a:ln>
+          </p:spPr>
+          <p:style>
+            <a:lnRef idx="2">
+              <a:schemeClr val="accent1">
+                <a:shade val="50000"/>
+              </a:schemeClr>
+            </a:lnRef>
+            <a:fillRef idx="1">
+              <a:schemeClr val="accent1"/>
+            </a:fillRef>
+            <a:effectRef idx="0">
+              <a:schemeClr val="accent1"/>
+            </a:effectRef>
+            <a:fontRef idx="minor">
+              <a:schemeClr val="lt1"/>
+            </a:fontRef>
+          </p:style>
+          <p:txBody>
+            <a:bodyPr rtlCol="0" anchor="ctr"/>
+            <a:lstStyle/>
+            <a:p>
+              <a:pPr algn="ctr"/>
+              <a:endParaRPr lang="en-US"/>
+            </a:p>
+          </p:txBody>
+        </p:sp>
+        <p:grpSp>
+          <p:nvGrpSpPr>
+            <p:cNvPr id="12" name="Group 11">
+              <a:extLst>
+                <a:ext uri="{FF2B5EF4-FFF2-40B4-BE49-F238E27FC236}">
+                  <a16:creationId xmlns:a16="http://schemas.microsoft.com/office/drawing/2014/main" id="{B94E7BD1-6B49-4B42-A251-85E4625476B5}"/>
+                </a:ext>
+              </a:extLst>
+            </p:cNvPr>
+            <p:cNvGrpSpPr/>
+            <p:nvPr/>
+          </p:nvGrpSpPr>
+          <p:grpSpPr>
+            <a:xfrm>
+              <a:off x="3936000" y="1269000"/>
+              <a:ext cx="4320000" cy="4320000"/>
+              <a:chOff x="2856001" y="1148551"/>
+              <a:chExt cx="4320000" cy="4320000"/>
+            </a:xfrm>
+          </p:grpSpPr>
+          <p:sp>
+            <p:nvSpPr>
+              <p:cNvPr id="13" name="Rectangle: Rounded Corners 12">
+                <a:extLst>
+                  <a:ext uri="{FF2B5EF4-FFF2-40B4-BE49-F238E27FC236}">
+                    <a16:creationId xmlns:a16="http://schemas.microsoft.com/office/drawing/2014/main" id="{57DE3ACB-F4FD-4716-BC0B-EFC27D89D6CD}"/>
+                  </a:ext>
+                </a:extLst>
+              </p:cNvPr>
+              <p:cNvSpPr/>
+              <p:nvPr/>
+            </p:nvSpPr>
+            <p:spPr>
+              <a:xfrm>
+                <a:off x="2856001" y="1148551"/>
+                <a:ext cx="4320000" cy="4320000"/>
+              </a:xfrm>
+              <a:prstGeom prst="roundRect">
+                <a:avLst/>
+              </a:prstGeom>
+              <a:solidFill>
+                <a:schemeClr val="tx1"/>
+              </a:solidFill>
+              <a:ln w="152400">
+                <a:solidFill>
+                  <a:schemeClr val="accent4"/>
+                </a:solidFill>
+              </a:ln>
+            </p:spPr>
+            <p:style>
+              <a:lnRef idx="2">
+                <a:schemeClr val="accent1">
+                  <a:shade val="50000"/>
+                </a:schemeClr>
+              </a:lnRef>
+              <a:fillRef idx="1">
+                <a:schemeClr val="accent1"/>
+              </a:fillRef>
+              <a:effectRef idx="0">
+                <a:schemeClr val="accent1"/>
+              </a:effectRef>
+              <a:fontRef idx="minor">
+                <a:schemeClr val="lt1"/>
+              </a:fontRef>
+            </p:style>
+            <p:txBody>
+              <a:bodyPr rtlCol="0" anchor="ctr"/>
+              <a:lstStyle/>
+              <a:p>
+                <a:pPr algn="ctr"/>
+                <a:endParaRPr lang="en-US" sz="13800" dirty="0">
+                  <a:solidFill>
+                    <a:schemeClr val="accent4"/>
+                  </a:solidFill>
+                  <a:latin typeface="Arial Black" panose="020B0A04020102020204" pitchFamily="34" charset="0"/>
+                </a:endParaRPr>
+              </a:p>
+              <a:p>
+                <a:pPr algn="ctr"/>
+                <a:endParaRPr lang="en-US" sz="13800" dirty="0">
+                  <a:solidFill>
+                    <a:schemeClr val="accent4"/>
+                  </a:solidFill>
+                  <a:latin typeface="Arial Black" panose="020B0A04020102020204" pitchFamily="34" charset="0"/>
+                </a:endParaRPr>
+              </a:p>
+            </p:txBody>
+          </p:sp>
+          <p:sp>
+            <p:nvSpPr>
+              <p:cNvPr id="14" name="Rectangle 13">
+                <a:extLst>
+                  <a:ext uri="{FF2B5EF4-FFF2-40B4-BE49-F238E27FC236}">
+                    <a16:creationId xmlns:a16="http://schemas.microsoft.com/office/drawing/2014/main" id="{39CA90B3-09A1-41C5-8C21-C7226505BA5F}"/>
+                  </a:ext>
+                </a:extLst>
+              </p:cNvPr>
+              <p:cNvSpPr/>
+              <p:nvPr/>
+            </p:nvSpPr>
+            <p:spPr>
+              <a:xfrm>
+                <a:off x="2978092" y="1269000"/>
+                <a:ext cx="1886668" cy="2215991"/>
+              </a:xfrm>
+              <a:prstGeom prst="rect">
+                <a:avLst/>
+              </a:prstGeom>
+            </p:spPr>
+            <p:txBody>
+              <a:bodyPr wrap="square" anchor="b">
+                <a:spAutoFit/>
+              </a:bodyPr>
+              <a:lstStyle/>
+              <a:p>
+                <a:pPr algn="r"/>
+                <a:r>
+                  <a:rPr lang="en-US" sz="13800" dirty="0">
+                    <a:solidFill>
+                      <a:schemeClr val="accent4"/>
+                    </a:solidFill>
+                    <a:latin typeface="Arial Black" panose="020B0A04020102020204" pitchFamily="34" charset="0"/>
+                  </a:rPr>
+                  <a:t>U</a:t>
+                </a:r>
+                <a:endParaRPr lang="en-US" sz="2400" dirty="0"/>
+              </a:p>
+            </p:txBody>
+          </p:sp>
+          <p:sp>
+            <p:nvSpPr>
+              <p:cNvPr id="15" name="Rectangle 14">
+                <a:extLst>
+                  <a:ext uri="{FF2B5EF4-FFF2-40B4-BE49-F238E27FC236}">
+                    <a16:creationId xmlns:a16="http://schemas.microsoft.com/office/drawing/2014/main" id="{ACDFDBE2-6B0C-48C1-9301-3D8E5BA4A965}"/>
+                  </a:ext>
+                </a:extLst>
+              </p:cNvPr>
+              <p:cNvSpPr/>
+              <p:nvPr/>
+            </p:nvSpPr>
+            <p:spPr>
+              <a:xfrm>
+                <a:off x="4940385" y="1268999"/>
+                <a:ext cx="2022477" cy="2215991"/>
+              </a:xfrm>
+              <a:prstGeom prst="rect">
+                <a:avLst/>
+              </a:prstGeom>
+            </p:spPr>
+            <p:txBody>
+              <a:bodyPr wrap="square" anchor="b">
+                <a:spAutoFit/>
+              </a:bodyPr>
+              <a:lstStyle/>
+              <a:p>
+                <a:r>
+                  <a:rPr lang="en-US" sz="13800" dirty="0">
+                    <a:solidFill>
+                      <a:schemeClr val="accent4"/>
+                    </a:solidFill>
+                    <a:latin typeface="Arial Black" panose="020B0A04020102020204" pitchFamily="34" charset="0"/>
+                  </a:rPr>
+                  <a:t>W</a:t>
+                </a:r>
+                <a:endParaRPr lang="en-US" sz="2400" dirty="0"/>
+              </a:p>
+            </p:txBody>
+          </p:sp>
+          <p:sp>
+            <p:nvSpPr>
+              <p:cNvPr id="16" name="Rectangle 15">
+                <a:extLst>
+                  <a:ext uri="{FF2B5EF4-FFF2-40B4-BE49-F238E27FC236}">
+                    <a16:creationId xmlns:a16="http://schemas.microsoft.com/office/drawing/2014/main" id="{36F425EA-1CBE-46E6-B5BB-DD2AB228CD2D}"/>
+                  </a:ext>
+                </a:extLst>
+              </p:cNvPr>
+              <p:cNvSpPr/>
+              <p:nvPr/>
+            </p:nvSpPr>
+            <p:spPr>
+              <a:xfrm>
+                <a:off x="3053708" y="3252560"/>
+                <a:ext cx="1886668" cy="2215991"/>
+              </a:xfrm>
+              <a:prstGeom prst="rect">
+                <a:avLst/>
+              </a:prstGeom>
+            </p:spPr>
+            <p:txBody>
+              <a:bodyPr wrap="square">
+                <a:spAutoFit/>
+              </a:bodyPr>
+              <a:lstStyle/>
+              <a:p>
+                <a:pPr algn="r"/>
+                <a:r>
+                  <a:rPr lang="en-US" sz="13800" dirty="0">
+                    <a:solidFill>
+                      <a:schemeClr val="accent4"/>
+                    </a:solidFill>
+                    <a:latin typeface="Arial Black" panose="020B0A04020102020204" pitchFamily="34" charset="0"/>
+                  </a:rPr>
+                  <a:t>O</a:t>
+                </a:r>
+                <a:endParaRPr lang="en-US" dirty="0"/>
+              </a:p>
+            </p:txBody>
+          </p:sp>
+          <p:sp>
+            <p:nvSpPr>
+              <p:cNvPr id="17" name="Rectangle 16">
+                <a:extLst>
+                  <a:ext uri="{FF2B5EF4-FFF2-40B4-BE49-F238E27FC236}">
+                    <a16:creationId xmlns:a16="http://schemas.microsoft.com/office/drawing/2014/main" id="{42030E45-6035-4F3C-9ED4-FF11D1181C2E}"/>
+                  </a:ext>
+                </a:extLst>
+              </p:cNvPr>
+              <p:cNvSpPr/>
+              <p:nvPr/>
+            </p:nvSpPr>
+            <p:spPr>
+              <a:xfrm>
+                <a:off x="5091624" y="3252560"/>
+                <a:ext cx="1795737" cy="2215991"/>
+              </a:xfrm>
+              <a:prstGeom prst="rect">
+                <a:avLst/>
+              </a:prstGeom>
+            </p:spPr>
+            <p:txBody>
+              <a:bodyPr wrap="square">
+                <a:spAutoFit/>
+              </a:bodyPr>
+              <a:lstStyle/>
+              <a:p>
+                <a:r>
+                  <a:rPr lang="en-US" sz="13800" dirty="0">
+                    <a:solidFill>
+                      <a:schemeClr val="accent4"/>
+                    </a:solidFill>
+                    <a:latin typeface="Arial Black" panose="020B0A04020102020204" pitchFamily="34" charset="0"/>
+                  </a:rPr>
+                  <a:t>C</a:t>
+                </a:r>
+                <a:endParaRPr lang="en-US" sz="2400" dirty="0"/>
+              </a:p>
+            </p:txBody>
+          </p:sp>
+        </p:grpSp>
+      </p:grpSp>
+    </p:spTree>
+    <p:extLst>
+      <p:ext uri="{BB962C8B-B14F-4D97-AF65-F5344CB8AC3E}">
+        <p14:creationId xmlns:p14="http://schemas.microsoft.com/office/powerpoint/2010/main" val="3527613"/>
+      </p:ext>
+    </p:extLst>
+  </p:cSld>
+  <p:clrMapOvr>
+    <a:masterClrMapping/>
+  </p:clrMapOvr>
+</p:sld>
+</file>
+
+<file path=ppt/slides/slide5.xml><?xml version="1.0" encoding="utf-8"?>
+<p:sld xmlns:a="http://schemas.openxmlformats.org/drawingml/2006/main" xmlns:r="http://schemas.openxmlformats.org/officeDocument/2006/relationships" xmlns:p="http://schemas.openxmlformats.org/presentationml/2006/main">
+  <p:cSld>
+    <p:spTree>
+      <p:nvGrpSpPr>
+        <p:cNvPr id="1" name=""/>
+        <p:cNvGrpSpPr/>
+        <p:nvPr/>
+      </p:nvGrpSpPr>
+      <p:grpSpPr>
+        <a:xfrm>
+          <a:off x="0" y="0"/>
+          <a:ext cx="0" cy="0"/>
+          <a:chOff x="0" y="0"/>
+          <a:chExt cx="0" cy="0"/>
+        </a:xfrm>
+      </p:grpSpPr>
       <p:sp>
         <p:nvSpPr>
           <p:cNvPr id="4" name="AutoShape 2" descr="Image result for refresh button">
@@ -5190,7 +5545,7 @@
 </p:sld>
 </file>
 
-<file path=ppt/slides/slide5.xml><?xml version="1.0" encoding="utf-8"?>
+<file path=ppt/slides/slide6.xml><?xml version="1.0" encoding="utf-8"?>
 <p:sld xmlns:a="http://schemas.openxmlformats.org/drawingml/2006/main" xmlns:r="http://schemas.openxmlformats.org/officeDocument/2006/relationships" xmlns:p="http://schemas.openxmlformats.org/presentationml/2006/main">
   <p:cSld>
     <p:spTree>

</xml_diff>